<commit_message>
Se agregan las tareas de pseudocodigo
</commit_message>
<xml_diff>
--- a/Selenium, session 2.pptx
+++ b/Selenium, session 2.pptx
@@ -41780,7 +41780,7 @@
           <a:graphicData uri="http://schemas.openxmlformats.org/presentationml/2006/ole">
             <mc:AlternateContent xmlns:mc="http://schemas.openxmlformats.org/markup-compatibility/2006">
               <mc:Choice xmlns:v="urn:schemas-microsoft-com:vml" Requires="v">
-                <p:oleObj spid="_x0000_s2052" name="Worksheet" showAsIcon="1" r:id="rId3" imgW="914400" imgH="771480" progId="Excel.Sheet.12">
+                <p:oleObj spid="_x0000_s2054" name="Worksheet" showAsIcon="1" r:id="rId3" imgW="914400" imgH="771480" progId="Excel.Sheet.12">
                   <p:embed/>
                 </p:oleObj>
               </mc:Choice>
@@ -41900,7 +41900,7 @@
           <p:nvPr>
             <p:extLst>
               <p:ext uri="{D42A27DB-BD31-4B8C-83A1-F6EECF244321}">
-                <p14:modId xmlns:p14="http://schemas.microsoft.com/office/powerpoint/2010/main" val="3589469881"/>
+                <p14:modId xmlns:p14="http://schemas.microsoft.com/office/powerpoint/2010/main" val="4270968247"/>
               </p:ext>
             </p:extLst>
           </p:nvPr>
@@ -41913,7 +41913,7 @@
           <a:graphicData uri="http://schemas.openxmlformats.org/presentationml/2006/ole">
             <mc:AlternateContent xmlns:mc="http://schemas.openxmlformats.org/markup-compatibility/2006">
               <mc:Choice xmlns:v="urn:schemas-microsoft-com:vml" Requires="v">
-                <p:oleObj spid="_x0000_s3076" name="Worksheet" showAsIcon="1" r:id="rId3" imgW="914400" imgH="771480" progId="Excel.Sheet.12">
+                <p:oleObj spid="_x0000_s3079" name="Worksheet" showAsIcon="1" r:id="rId3" imgW="914400" imgH="771480" progId="Excel.Sheet.12">
                   <p:embed/>
                 </p:oleObj>
               </mc:Choice>
@@ -42729,7 +42729,7 @@
           <a:graphicData uri="http://schemas.openxmlformats.org/presentationml/2006/ole">
             <mc:AlternateContent xmlns:mc="http://schemas.openxmlformats.org/markup-compatibility/2006">
               <mc:Choice xmlns:v="urn:schemas-microsoft-com:vml" Requires="v">
-                <p:oleObj spid="_x0000_s4100" name="Worksheet" showAsIcon="1" r:id="rId3" imgW="914400" imgH="771480" progId="Excel.Sheet.12">
+                <p:oleObj spid="_x0000_s4102" name="Worksheet" showAsIcon="1" r:id="rId3" imgW="914400" imgH="771480" progId="Excel.Sheet.12">
                   <p:embed/>
                 </p:oleObj>
               </mc:Choice>
@@ -42870,7 +42870,7 @@
           <a:graphicData uri="http://schemas.openxmlformats.org/presentationml/2006/ole">
             <mc:AlternateContent xmlns:mc="http://schemas.openxmlformats.org/markup-compatibility/2006">
               <mc:Choice xmlns:v="urn:schemas-microsoft-com:vml" Requires="v">
-                <p:oleObj spid="_x0000_s5124" name="Worksheet" showAsIcon="1" r:id="rId3" imgW="914400" imgH="771480" progId="Excel.Sheet.12">
+                <p:oleObj spid="_x0000_s5126" name="Worksheet" showAsIcon="1" r:id="rId3" imgW="914400" imgH="771480" progId="Excel.Sheet.12">
                   <p:embed/>
                 </p:oleObj>
               </mc:Choice>
@@ -44380,7 +44380,7 @@
           <a:graphicData uri="http://schemas.openxmlformats.org/presentationml/2006/ole">
             <mc:AlternateContent xmlns:mc="http://schemas.openxmlformats.org/markup-compatibility/2006">
               <mc:Choice xmlns:v="urn:schemas-microsoft-com:vml" Requires="v">
-                <p:oleObj spid="_x0000_s6148" name="Worksheet" showAsIcon="1" r:id="rId3" imgW="914400" imgH="771480" progId="Excel.Sheet.12">
+                <p:oleObj spid="_x0000_s6150" name="Worksheet" showAsIcon="1" r:id="rId3" imgW="914400" imgH="771480" progId="Excel.Sheet.12">
                   <p:embed/>
                 </p:oleObj>
               </mc:Choice>
@@ -45658,7 +45658,13 @@
           <p:cNvGraphicFramePr>
             <a:graphicFrameLocks noChangeAspect="1"/>
           </p:cNvGraphicFramePr>
-          <p:nvPr/>
+          <p:nvPr>
+            <p:extLst>
+              <p:ext uri="{D42A27DB-BD31-4B8C-83A1-F6EECF244321}">
+                <p14:modId xmlns:p14="http://schemas.microsoft.com/office/powerpoint/2010/main" val="3214026205"/>
+              </p:ext>
+            </p:extLst>
+          </p:nvPr>
         </p:nvGraphicFramePr>
         <p:xfrm>
           <a:off x="5638800" y="3041650"/>
@@ -45668,7 +45674,7 @@
           <a:graphicData uri="http://schemas.openxmlformats.org/presentationml/2006/ole">
             <mc:AlternateContent xmlns:mc="http://schemas.openxmlformats.org/markup-compatibility/2006">
               <mc:Choice xmlns:v="urn:schemas-microsoft-com:vml" Requires="v">
-                <p:oleObj spid="_x0000_s7172" name="Worksheet" showAsIcon="1" r:id="rId3" imgW="914400" imgH="771480" progId="Excel.Sheet.12">
+                <p:oleObj spid="_x0000_s7175" name="Worksheet" showAsIcon="1" r:id="rId3" imgW="914400" imgH="771480" progId="Excel.Sheet.12">
                   <p:embed/>
                 </p:oleObj>
               </mc:Choice>
@@ -45822,7 +45828,7 @@
           <a:graphicData uri="http://schemas.openxmlformats.org/presentationml/2006/ole">
             <mc:AlternateContent xmlns:mc="http://schemas.openxmlformats.org/markup-compatibility/2006">
               <mc:Choice xmlns:v="urn:schemas-microsoft-com:vml" Requires="v">
-                <p:oleObj spid="_x0000_s8196" name="Worksheet" showAsIcon="1" r:id="rId3" imgW="914400" imgH="771480" progId="Excel.Sheet.12">
+                <p:oleObj spid="_x0000_s8198" name="Worksheet" showAsIcon="1" r:id="rId3" imgW="914400" imgH="771480" progId="Excel.Sheet.12">
                   <p:embed/>
                 </p:oleObj>
               </mc:Choice>

</xml_diff>